<commit_message>
updated some outdated documents and reduced bugs found relating to broken links
</commit_message>
<xml_diff>
--- a/ActiveNet Trainer/PowerPoint Creations/POS-Policy.pptx
+++ b/ActiveNet Trainer/PowerPoint Creations/POS-Policy.pptx
@@ -3006,6 +3006,13 @@
         </dgm:presLayoutVars>
       </dgm:prSet>
       <dgm:spPr/>
+      <dgm:t>
+        <a:bodyPr/>
+        <a:lstStyle/>
+        <a:p>
+          <a:endParaRPr lang="en-US"/>
+        </a:p>
+      </dgm:t>
     </dgm:pt>
     <dgm:pt modelId="{BF0DC3A1-3415-40E5-BF82-E5D4F50B2B2B}" type="pres">
       <dgm:prSet presAssocID="{2777F76A-866C-4F35-9E40-3BCE03B691BD}" presName="parentLin" presStyleCnt="0"/>
@@ -3014,6 +3021,13 @@
     <dgm:pt modelId="{B2994393-C3D8-4843-AF83-366B88570832}" type="pres">
       <dgm:prSet presAssocID="{2777F76A-866C-4F35-9E40-3BCE03B691BD}" presName="parentLeftMargin" presStyleLbl="node1" presStyleIdx="0" presStyleCnt="3"/>
       <dgm:spPr/>
+      <dgm:t>
+        <a:bodyPr/>
+        <a:lstStyle/>
+        <a:p>
+          <a:endParaRPr lang="en-US"/>
+        </a:p>
+      </dgm:t>
     </dgm:pt>
     <dgm:pt modelId="{03957605-516E-49D8-BB77-63AB8A30758C}" type="pres">
       <dgm:prSet presAssocID="{2777F76A-866C-4F35-9E40-3BCE03B691BD}" presName="parentText" presStyleLbl="node1" presStyleIdx="0" presStyleCnt="3">
@@ -3023,6 +3037,13 @@
         </dgm:presLayoutVars>
       </dgm:prSet>
       <dgm:spPr/>
+      <dgm:t>
+        <a:bodyPr/>
+        <a:lstStyle/>
+        <a:p>
+          <a:endParaRPr lang="en-US"/>
+        </a:p>
+      </dgm:t>
     </dgm:pt>
     <dgm:pt modelId="{FB1BBFBC-4C8C-4856-A671-1951CAA77D1A}" type="pres">
       <dgm:prSet presAssocID="{2777F76A-866C-4F35-9E40-3BCE03B691BD}" presName="negativeSpace" presStyleCnt="0"/>
@@ -3054,6 +3075,13 @@
     <dgm:pt modelId="{54479455-F533-4093-8592-5DCCE05C5ABF}" type="pres">
       <dgm:prSet presAssocID="{CD6DA511-09DA-48A1-94CB-FEC32CD7B237}" presName="parentLeftMargin" presStyleLbl="node1" presStyleIdx="0" presStyleCnt="3"/>
       <dgm:spPr/>
+      <dgm:t>
+        <a:bodyPr/>
+        <a:lstStyle/>
+        <a:p>
+          <a:endParaRPr lang="en-US"/>
+        </a:p>
+      </dgm:t>
     </dgm:pt>
     <dgm:pt modelId="{6938D4F8-2AB5-4B96-B0B4-E65635922F15}" type="pres">
       <dgm:prSet presAssocID="{CD6DA511-09DA-48A1-94CB-FEC32CD7B237}" presName="parentText" presStyleLbl="node1" presStyleIdx="1" presStyleCnt="3">
@@ -3101,6 +3129,13 @@
     <dgm:pt modelId="{FCFCAA7F-4B19-4413-A187-39354A32F358}" type="pres">
       <dgm:prSet presAssocID="{3A5EFB2F-D472-4DA7-BCC6-367F658AB39E}" presName="parentLeftMargin" presStyleLbl="node1" presStyleIdx="1" presStyleCnt="3"/>
       <dgm:spPr/>
+      <dgm:t>
+        <a:bodyPr/>
+        <a:lstStyle/>
+        <a:p>
+          <a:endParaRPr lang="en-US"/>
+        </a:p>
+      </dgm:t>
     </dgm:pt>
     <dgm:pt modelId="{F226D021-1AAB-4D3B-91FC-A06225580D7E}" type="pres">
       <dgm:prSet presAssocID="{3A5EFB2F-D472-4DA7-BCC6-367F658AB39E}" presName="parentText" presStyleLbl="node1" presStyleIdx="2" presStyleCnt="3">
@@ -3110,6 +3145,13 @@
         </dgm:presLayoutVars>
       </dgm:prSet>
       <dgm:spPr/>
+      <dgm:t>
+        <a:bodyPr/>
+        <a:lstStyle/>
+        <a:p>
+          <a:endParaRPr lang="en-US"/>
+        </a:p>
+      </dgm:t>
     </dgm:pt>
     <dgm:pt modelId="{49409EB1-FC3C-4471-8D37-E7EE724418C6}" type="pres">
       <dgm:prSet presAssocID="{3A5EFB2F-D472-4DA7-BCC6-367F658AB39E}" presName="negativeSpace" presStyleCnt="0"/>
@@ -3138,8 +3180,8 @@
     <dgm:cxn modelId="{A840D76F-341D-48F6-9E05-04DC1786CD41}" srcId="{DBF73EDD-333C-4C62-B881-02122CE5FE61}" destId="{3A5EFB2F-D472-4DA7-BCC6-367F658AB39E}" srcOrd="2" destOrd="0" parTransId="{8AE99A1A-B6C3-4C5C-93D2-2BFBDB5605F4}" sibTransId="{867857CF-5965-43F2-874E-0F683FA5249F}"/>
     <dgm:cxn modelId="{494B2093-2D38-44E7-9D80-E5A8323D2599}" type="presOf" srcId="{CD6DA511-09DA-48A1-94CB-FEC32CD7B237}" destId="{6938D4F8-2AB5-4B96-B0B4-E65635922F15}" srcOrd="1" destOrd="0" presId="urn:microsoft.com/office/officeart/2005/8/layout/list1"/>
     <dgm:cxn modelId="{7608263C-8BB8-46BC-92E2-D38A5240FB06}" type="presOf" srcId="{F57140A7-52D2-4628-B8AF-8A0B536CC93D}" destId="{760423D8-6341-449E-AC15-2EABEFC490D3}" srcOrd="0" destOrd="0" presId="urn:microsoft.com/office/officeart/2005/8/layout/list1"/>
+    <dgm:cxn modelId="{87AF25D7-ECB3-40A3-823C-0F230B7CAAC6}" srcId="{3A5EFB2F-D472-4DA7-BCC6-367F658AB39E}" destId="{F933A5DC-811B-49D6-96DE-D418AE0E4DF5}" srcOrd="0" destOrd="0" parTransId="{CCE2AEB9-D5E3-4197-A148-24E7E11FC1AB}" sibTransId="{BBA16927-684E-4EEE-91EC-0C84A35433B6}"/>
     <dgm:cxn modelId="{F941A43A-03D4-41C6-B995-F6E25F4D95DD}" srcId="{DBF73EDD-333C-4C62-B881-02122CE5FE61}" destId="{2777F76A-866C-4F35-9E40-3BCE03B691BD}" srcOrd="0" destOrd="0" parTransId="{3436FDD8-4ED5-42FF-B11B-A624BFCE5DD7}" sibTransId="{4BE48F94-DD4B-4B89-94B7-E076D6AC018C}"/>
-    <dgm:cxn modelId="{87AF25D7-ECB3-40A3-823C-0F230B7CAAC6}" srcId="{3A5EFB2F-D472-4DA7-BCC6-367F658AB39E}" destId="{F933A5DC-811B-49D6-96DE-D418AE0E4DF5}" srcOrd="0" destOrd="0" parTransId="{CCE2AEB9-D5E3-4197-A148-24E7E11FC1AB}" sibTransId="{BBA16927-684E-4EEE-91EC-0C84A35433B6}"/>
     <dgm:cxn modelId="{D3FCF1EC-D813-45AB-9C12-A4558FCC7ED0}" type="presOf" srcId="{AF746EBD-7EE0-407C-9D43-327FD6DFAB40}" destId="{5C4164AB-474A-4BE4-9748-428EFE961B11}" srcOrd="0" destOrd="1" presId="urn:microsoft.com/office/officeart/2005/8/layout/list1"/>
     <dgm:cxn modelId="{1A2A5D76-A7C5-456C-8BCB-76C36B109AF0}" type="presOf" srcId="{F933A5DC-811B-49D6-96DE-D418AE0E4DF5}" destId="{5C4164AB-474A-4BE4-9748-428EFE961B11}" srcOrd="0" destOrd="0" presId="urn:microsoft.com/office/officeart/2005/8/layout/list1"/>
     <dgm:cxn modelId="{BA671598-9128-4CAE-9B0C-2C28DCE5C871}" srcId="{DBF73EDD-333C-4C62-B881-02122CE5FE61}" destId="{CD6DA511-09DA-48A1-94CB-FEC32CD7B237}" srcOrd="1" destOrd="0" parTransId="{EDB9ECE8-D0DB-4A40-BF70-FC9FEA1D7623}" sibTransId="{BA37D960-9A06-4F32-9941-DFE45F217042}"/>
@@ -3484,6 +3526,13 @@
         </dgm:presLayoutVars>
       </dgm:prSet>
       <dgm:spPr/>
+      <dgm:t>
+        <a:bodyPr/>
+        <a:lstStyle/>
+        <a:p>
+          <a:endParaRPr lang="en-US"/>
+        </a:p>
+      </dgm:t>
     </dgm:pt>
     <dgm:pt modelId="{BF0DC3A1-3415-40E5-BF82-E5D4F50B2B2B}" type="pres">
       <dgm:prSet presAssocID="{2777F76A-866C-4F35-9E40-3BCE03B691BD}" presName="parentLin" presStyleCnt="0"/>
@@ -3492,6 +3541,13 @@
     <dgm:pt modelId="{B2994393-C3D8-4843-AF83-366B88570832}" type="pres">
       <dgm:prSet presAssocID="{2777F76A-866C-4F35-9E40-3BCE03B691BD}" presName="parentLeftMargin" presStyleLbl="node1" presStyleIdx="0" presStyleCnt="3"/>
       <dgm:spPr/>
+      <dgm:t>
+        <a:bodyPr/>
+        <a:lstStyle/>
+        <a:p>
+          <a:endParaRPr lang="en-US"/>
+        </a:p>
+      </dgm:t>
     </dgm:pt>
     <dgm:pt modelId="{03957605-516E-49D8-BB77-63AB8A30758C}" type="pres">
       <dgm:prSet presAssocID="{2777F76A-866C-4F35-9E40-3BCE03B691BD}" presName="parentText" presStyleLbl="node1" presStyleIdx="0" presStyleCnt="3">
@@ -3501,6 +3557,13 @@
         </dgm:presLayoutVars>
       </dgm:prSet>
       <dgm:spPr/>
+      <dgm:t>
+        <a:bodyPr/>
+        <a:lstStyle/>
+        <a:p>
+          <a:endParaRPr lang="en-US"/>
+        </a:p>
+      </dgm:t>
     </dgm:pt>
     <dgm:pt modelId="{FB1BBFBC-4C8C-4856-A671-1951CAA77D1A}" type="pres">
       <dgm:prSet presAssocID="{2777F76A-866C-4F35-9E40-3BCE03B691BD}" presName="negativeSpace" presStyleCnt="0"/>
@@ -3532,6 +3595,13 @@
     <dgm:pt modelId="{54479455-F533-4093-8592-5DCCE05C5ABF}" type="pres">
       <dgm:prSet presAssocID="{CD6DA511-09DA-48A1-94CB-FEC32CD7B237}" presName="parentLeftMargin" presStyleLbl="node1" presStyleIdx="0" presStyleCnt="3"/>
       <dgm:spPr/>
+      <dgm:t>
+        <a:bodyPr/>
+        <a:lstStyle/>
+        <a:p>
+          <a:endParaRPr lang="en-US"/>
+        </a:p>
+      </dgm:t>
     </dgm:pt>
     <dgm:pt modelId="{6938D4F8-2AB5-4B96-B0B4-E65635922F15}" type="pres">
       <dgm:prSet presAssocID="{CD6DA511-09DA-48A1-94CB-FEC32CD7B237}" presName="parentText" presStyleLbl="node1" presStyleIdx="1" presStyleCnt="3">
@@ -3579,6 +3649,13 @@
     <dgm:pt modelId="{FCFCAA7F-4B19-4413-A187-39354A32F358}" type="pres">
       <dgm:prSet presAssocID="{3A5EFB2F-D472-4DA7-BCC6-367F658AB39E}" presName="parentLeftMargin" presStyleLbl="node1" presStyleIdx="1" presStyleCnt="3"/>
       <dgm:spPr/>
+      <dgm:t>
+        <a:bodyPr/>
+        <a:lstStyle/>
+        <a:p>
+          <a:endParaRPr lang="en-US"/>
+        </a:p>
+      </dgm:t>
     </dgm:pt>
     <dgm:pt modelId="{F226D021-1AAB-4D3B-91FC-A06225580D7E}" type="pres">
       <dgm:prSet presAssocID="{3A5EFB2F-D472-4DA7-BCC6-367F658AB39E}" presName="parentText" presStyleLbl="node1" presStyleIdx="2" presStyleCnt="3">
@@ -3619,8 +3696,8 @@
   <dgm:cxnLst>
     <dgm:cxn modelId="{D02EAC3E-2C3F-4E51-8777-41A550FBF0DD}" type="presOf" srcId="{41750358-CBCC-404F-8DB4-9AB002BED3D8}" destId="{5C4164AB-474A-4BE4-9748-428EFE961B11}" srcOrd="0" destOrd="0" presId="urn:microsoft.com/office/officeart/2005/8/layout/list1"/>
     <dgm:cxn modelId="{99C4CCFC-16C9-482B-911C-C258141EC13A}" type="presOf" srcId="{DBF73EDD-333C-4C62-B881-02122CE5FE61}" destId="{76B3452C-236A-4377-A093-685752666BF0}" srcOrd="0" destOrd="0" presId="urn:microsoft.com/office/officeart/2005/8/layout/list1"/>
+    <dgm:cxn modelId="{6681DCC0-7251-414E-969E-269CCCB9E5D8}" srcId="{3A5EFB2F-D472-4DA7-BCC6-367F658AB39E}" destId="{F67E30E1-D48E-4DB7-AD1B-CE9758CCAC69}" srcOrd="1" destOrd="0" parTransId="{B8A0F18C-F88F-4F86-89FC-01E0F3810CBD}" sibTransId="{B191B670-7C3E-474D-ADC8-F6B4D6F80F8A}"/>
     <dgm:cxn modelId="{C17D8015-AF4B-487F-89CC-04847CED3279}" type="presOf" srcId="{F57140A7-52D2-4628-B8AF-8A0B536CC93D}" destId="{760423D8-6341-449E-AC15-2EABEFC490D3}" srcOrd="0" destOrd="0" presId="urn:microsoft.com/office/officeart/2005/8/layout/list1"/>
-    <dgm:cxn modelId="{6681DCC0-7251-414E-969E-269CCCB9E5D8}" srcId="{3A5EFB2F-D472-4DA7-BCC6-367F658AB39E}" destId="{F67E30E1-D48E-4DB7-AD1B-CE9758CCAC69}" srcOrd="1" destOrd="0" parTransId="{B8A0F18C-F88F-4F86-89FC-01E0F3810CBD}" sibTransId="{B191B670-7C3E-474D-ADC8-F6B4D6F80F8A}"/>
     <dgm:cxn modelId="{A840D76F-341D-48F6-9E05-04DC1786CD41}" srcId="{DBF73EDD-333C-4C62-B881-02122CE5FE61}" destId="{3A5EFB2F-D472-4DA7-BCC6-367F658AB39E}" srcOrd="2" destOrd="0" parTransId="{8AE99A1A-B6C3-4C5C-93D2-2BFBDB5605F4}" sibTransId="{867857CF-5965-43F2-874E-0F683FA5249F}"/>
     <dgm:cxn modelId="{F941A43A-03D4-41C6-B995-F6E25F4D95DD}" srcId="{DBF73EDD-333C-4C62-B881-02122CE5FE61}" destId="{2777F76A-866C-4F35-9E40-3BCE03B691BD}" srcOrd="0" destOrd="0" parTransId="{3436FDD8-4ED5-42FF-B11B-A624BFCE5DD7}" sibTransId="{4BE48F94-DD4B-4B89-94B7-E076D6AC018C}"/>
     <dgm:cxn modelId="{4497E5CC-0421-442B-B6B2-C7D0D1AFC4F9}" type="presOf" srcId="{F67E30E1-D48E-4DB7-AD1B-CE9758CCAC69}" destId="{5C4164AB-474A-4BE4-9748-428EFE961B11}" srcOrd="0" destOrd="1" presId="urn:microsoft.com/office/officeart/2005/8/layout/list1"/>
@@ -3949,6 +4026,13 @@
         </dgm:presLayoutVars>
       </dgm:prSet>
       <dgm:spPr/>
+      <dgm:t>
+        <a:bodyPr/>
+        <a:lstStyle/>
+        <a:p>
+          <a:endParaRPr lang="en-US"/>
+        </a:p>
+      </dgm:t>
     </dgm:pt>
     <dgm:pt modelId="{BCA1AF52-FF07-45C4-85E8-613A70A48E55}" type="pres">
       <dgm:prSet presAssocID="{60AC6A14-804B-4C73-A3F8-15D682701FA9}" presName="parentLin" presStyleCnt="0"/>
@@ -3957,6 +4041,13 @@
     <dgm:pt modelId="{9379AB90-BD1F-4A03-86B5-4785D3AB64A7}" type="pres">
       <dgm:prSet presAssocID="{60AC6A14-804B-4C73-A3F8-15D682701FA9}" presName="parentLeftMargin" presStyleLbl="node1" presStyleIdx="0" presStyleCnt="3"/>
       <dgm:spPr/>
+      <dgm:t>
+        <a:bodyPr/>
+        <a:lstStyle/>
+        <a:p>
+          <a:endParaRPr lang="en-US"/>
+        </a:p>
+      </dgm:t>
     </dgm:pt>
     <dgm:pt modelId="{E14DA548-9018-4DC6-8A10-41646B05C52D}" type="pres">
       <dgm:prSet presAssocID="{60AC6A14-804B-4C73-A3F8-15D682701FA9}" presName="parentText" presStyleLbl="node1" presStyleIdx="0" presStyleCnt="3">
@@ -4004,6 +4095,13 @@
     <dgm:pt modelId="{D9EAD290-981B-490D-976A-B8FB9E390B68}" type="pres">
       <dgm:prSet presAssocID="{81C2013A-F197-40F1-8EE4-3C21F2E1CA71}" presName="parentLeftMargin" presStyleLbl="node1" presStyleIdx="0" presStyleCnt="3"/>
       <dgm:spPr/>
+      <dgm:t>
+        <a:bodyPr/>
+        <a:lstStyle/>
+        <a:p>
+          <a:endParaRPr lang="en-US"/>
+        </a:p>
+      </dgm:t>
     </dgm:pt>
     <dgm:pt modelId="{DD943D49-4AE3-447E-B3A5-00B8B281A284}" type="pres">
       <dgm:prSet presAssocID="{81C2013A-F197-40F1-8EE4-3C21F2E1CA71}" presName="parentText" presStyleLbl="node1" presStyleIdx="1" presStyleCnt="3">
@@ -4013,6 +4111,13 @@
         </dgm:presLayoutVars>
       </dgm:prSet>
       <dgm:spPr/>
+      <dgm:t>
+        <a:bodyPr/>
+        <a:lstStyle/>
+        <a:p>
+          <a:endParaRPr lang="en-US"/>
+        </a:p>
+      </dgm:t>
     </dgm:pt>
     <dgm:pt modelId="{CC7833E9-6F1B-45AF-8B97-094BC485D91B}" type="pres">
       <dgm:prSet presAssocID="{81C2013A-F197-40F1-8EE4-3C21F2E1CA71}" presName="negativeSpace" presStyleCnt="0"/>
@@ -4044,6 +4149,13 @@
     <dgm:pt modelId="{C55AC184-4B63-4ACF-BAEE-BAFED4D9CE01}" type="pres">
       <dgm:prSet presAssocID="{2955A9BB-B772-4BED-A761-88D6294E71E5}" presName="parentLeftMargin" presStyleLbl="node1" presStyleIdx="1" presStyleCnt="3"/>
       <dgm:spPr/>
+      <dgm:t>
+        <a:bodyPr/>
+        <a:lstStyle/>
+        <a:p>
+          <a:endParaRPr lang="en-US"/>
+        </a:p>
+      </dgm:t>
     </dgm:pt>
     <dgm:pt modelId="{946F776E-CA37-4577-818D-C4AF700DFAD5}" type="pres">
       <dgm:prSet presAssocID="{2955A9BB-B772-4BED-A761-88D6294E71E5}" presName="parentText" presStyleLbl="node1" presStyleIdx="2" presStyleCnt="3">
@@ -4053,6 +4165,13 @@
         </dgm:presLayoutVars>
       </dgm:prSet>
       <dgm:spPr/>
+      <dgm:t>
+        <a:bodyPr/>
+        <a:lstStyle/>
+        <a:p>
+          <a:endParaRPr lang="en-US"/>
+        </a:p>
+      </dgm:t>
     </dgm:pt>
     <dgm:pt modelId="{D282B98D-1A08-4E69-89A3-E629A7931AFD}" type="pres">
       <dgm:prSet presAssocID="{2955A9BB-B772-4BED-A761-88D6294E71E5}" presName="negativeSpace" presStyleCnt="0"/>
@@ -4075,23 +4194,23 @@
     </dgm:pt>
   </dgm:ptLst>
   <dgm:cxnLst>
+    <dgm:cxn modelId="{77F39BCD-B22E-4A7F-8F97-39C07908BD7D}" srcId="{DBF73EDD-333C-4C62-B881-02122CE5FE61}" destId="{60AC6A14-804B-4C73-A3F8-15D682701FA9}" srcOrd="0" destOrd="0" parTransId="{59741504-FFDC-43FC-9267-3BCCF5F27BAD}" sibTransId="{349354F8-D5CB-44EA-932E-91EE67F37ADE}"/>
+    <dgm:cxn modelId="{FD05F7B7-E05E-435C-AC66-A55FE07BCEF9}" type="presOf" srcId="{60AC6A14-804B-4C73-A3F8-15D682701FA9}" destId="{9379AB90-BD1F-4A03-86B5-4785D3AB64A7}" srcOrd="0" destOrd="0" presId="urn:microsoft.com/office/officeart/2005/8/layout/list1"/>
+    <dgm:cxn modelId="{D545207C-928C-4706-A68A-90933FC04F85}" srcId="{60AC6A14-804B-4C73-A3F8-15D682701FA9}" destId="{073B40D1-B301-4BF4-B401-05B2D048F9A5}" srcOrd="0" destOrd="0" parTransId="{66B0F216-1491-4058-8C36-037C7FEBE072}" sibTransId="{3106EB2E-01E8-4EC1-948A-12BC40E4FF9E}"/>
+    <dgm:cxn modelId="{614E0004-52C5-4AD1-982C-76280EBFCB9D}" srcId="{DBF73EDD-333C-4C62-B881-02122CE5FE61}" destId="{81C2013A-F197-40F1-8EE4-3C21F2E1CA71}" srcOrd="1" destOrd="0" parTransId="{124D0B2B-21E9-41FC-BF34-B0AA7B437495}" sibTransId="{91DB9FBB-FC90-49F2-9EB2-FFA83846B88C}"/>
+    <dgm:cxn modelId="{129604FD-CBE7-4DB3-9DE9-9E4E11BA4FC1}" type="presOf" srcId="{2955A9BB-B772-4BED-A761-88D6294E71E5}" destId="{946F776E-CA37-4577-818D-C4AF700DFAD5}" srcOrd="1" destOrd="0" presId="urn:microsoft.com/office/officeart/2005/8/layout/list1"/>
+    <dgm:cxn modelId="{E4F3DE94-CAD1-47D5-8153-765364DB8A12}" type="presOf" srcId="{60AC6A14-804B-4C73-A3F8-15D682701FA9}" destId="{E14DA548-9018-4DC6-8A10-41646B05C52D}" srcOrd="1" destOrd="0" presId="urn:microsoft.com/office/officeart/2005/8/layout/list1"/>
+    <dgm:cxn modelId="{81D7AA39-7EC8-4FA4-99EC-D757B22D4E3B}" srcId="{81C2013A-F197-40F1-8EE4-3C21F2E1CA71}" destId="{CFFF9D9D-E8F3-480B-BAE3-9050BDB627A5}" srcOrd="0" destOrd="0" parTransId="{6B871A84-A1E1-422A-A290-3287E83BD7D5}" sibTransId="{0DD315D4-0B69-44E9-894F-42886C3F7C41}"/>
+    <dgm:cxn modelId="{27726CDC-2302-450F-B4A8-CC5E878D0833}" srcId="{2955A9BB-B772-4BED-A761-88D6294E71E5}" destId="{A57ADE3E-0C8C-4D36-A8FB-BB92178FCA0C}" srcOrd="1" destOrd="0" parTransId="{0888E583-FAE3-4DF0-907A-CB123EF3AFA6}" sibTransId="{9CBCFCCE-1D43-4AC3-B34F-F3F28F62DBED}"/>
+    <dgm:cxn modelId="{8F5D46A5-1C75-4C33-BED6-222ADC7D5D53}" type="presOf" srcId="{81C2013A-F197-40F1-8EE4-3C21F2E1CA71}" destId="{D9EAD290-981B-490D-976A-B8FB9E390B68}" srcOrd="0" destOrd="0" presId="urn:microsoft.com/office/officeart/2005/8/layout/list1"/>
+    <dgm:cxn modelId="{A6457D2B-F992-4D3F-9FAA-480FD19AF47D}" type="presOf" srcId="{073B40D1-B301-4BF4-B401-05B2D048F9A5}" destId="{B4C3ACB7-66C8-4B3D-B45F-BCF074EF9EC4}" srcOrd="0" destOrd="0" presId="urn:microsoft.com/office/officeart/2005/8/layout/list1"/>
     <dgm:cxn modelId="{FF6E7261-C058-492A-A9CD-FDE3D0A38C1A}" srcId="{DBF73EDD-333C-4C62-B881-02122CE5FE61}" destId="{2955A9BB-B772-4BED-A761-88D6294E71E5}" srcOrd="2" destOrd="0" parTransId="{D6541110-54B7-4A1F-8237-38D2C996D666}" sibTransId="{3F99F8E0-12B8-403B-B743-6DD30BF19C85}"/>
-    <dgm:cxn modelId="{8F5D46A5-1C75-4C33-BED6-222ADC7D5D53}" type="presOf" srcId="{81C2013A-F197-40F1-8EE4-3C21F2E1CA71}" destId="{D9EAD290-981B-490D-976A-B8FB9E390B68}" srcOrd="0" destOrd="0" presId="urn:microsoft.com/office/officeart/2005/8/layout/list1"/>
+    <dgm:cxn modelId="{EA4DFC26-AAF7-47C7-8ED5-B1C0A3F84DC2}" type="presOf" srcId="{81C2013A-F197-40F1-8EE4-3C21F2E1CA71}" destId="{DD943D49-4AE3-447E-B3A5-00B8B281A284}" srcOrd="1" destOrd="0" presId="urn:microsoft.com/office/officeart/2005/8/layout/list1"/>
     <dgm:cxn modelId="{354C8C87-FEFA-4601-A928-F3E6BBA82D4B}" srcId="{2955A9BB-B772-4BED-A761-88D6294E71E5}" destId="{5B63288E-9A09-405F-8EFD-69E64A5D5ABB}" srcOrd="0" destOrd="0" parTransId="{1AB185C9-B527-4BB7-B60A-37F46C94F8E6}" sibTransId="{EC717958-7BA8-4547-89FF-676F55D5B745}"/>
-    <dgm:cxn modelId="{D545207C-928C-4706-A68A-90933FC04F85}" srcId="{60AC6A14-804B-4C73-A3F8-15D682701FA9}" destId="{073B40D1-B301-4BF4-B401-05B2D048F9A5}" srcOrd="0" destOrd="0" parTransId="{66B0F216-1491-4058-8C36-037C7FEBE072}" sibTransId="{3106EB2E-01E8-4EC1-948A-12BC40E4FF9E}"/>
-    <dgm:cxn modelId="{77F39BCD-B22E-4A7F-8F97-39C07908BD7D}" srcId="{DBF73EDD-333C-4C62-B881-02122CE5FE61}" destId="{60AC6A14-804B-4C73-A3F8-15D682701FA9}" srcOrd="0" destOrd="0" parTransId="{59741504-FFDC-43FC-9267-3BCCF5F27BAD}" sibTransId="{349354F8-D5CB-44EA-932E-91EE67F37ADE}"/>
-    <dgm:cxn modelId="{614E0004-52C5-4AD1-982C-76280EBFCB9D}" srcId="{DBF73EDD-333C-4C62-B881-02122CE5FE61}" destId="{81C2013A-F197-40F1-8EE4-3C21F2E1CA71}" srcOrd="1" destOrd="0" parTransId="{124D0B2B-21E9-41FC-BF34-B0AA7B437495}" sibTransId="{91DB9FBB-FC90-49F2-9EB2-FFA83846B88C}"/>
+    <dgm:cxn modelId="{5275C668-77DF-4917-98D7-FD2B65C172D7}" type="presOf" srcId="{2955A9BB-B772-4BED-A761-88D6294E71E5}" destId="{C55AC184-4B63-4ACF-BAEE-BAFED4D9CE01}" srcOrd="0" destOrd="0" presId="urn:microsoft.com/office/officeart/2005/8/layout/list1"/>
+    <dgm:cxn modelId="{41E44325-4E28-4A02-8B52-8592C6942564}" type="presOf" srcId="{DBF73EDD-333C-4C62-B881-02122CE5FE61}" destId="{76B3452C-236A-4377-A093-685752666BF0}" srcOrd="0" destOrd="0" presId="urn:microsoft.com/office/officeart/2005/8/layout/list1"/>
+    <dgm:cxn modelId="{F57140FF-C6E1-4749-BBD2-4F7B784B665F}" type="presOf" srcId="{5B63288E-9A09-405F-8EFD-69E64A5D5ABB}" destId="{DCC890C1-F94A-46B7-86BB-70B2BC9F9AC7}" srcOrd="0" destOrd="0" presId="urn:microsoft.com/office/officeart/2005/8/layout/list1"/>
     <dgm:cxn modelId="{7AAB4884-93D6-4751-8E20-1649699E3322}" type="presOf" srcId="{CFFF9D9D-E8F3-480B-BAE3-9050BDB627A5}" destId="{2C17AC90-E20E-49A5-AF6F-A64672E5E471}" srcOrd="0" destOrd="0" presId="urn:microsoft.com/office/officeart/2005/8/layout/list1"/>
-    <dgm:cxn modelId="{5275C668-77DF-4917-98D7-FD2B65C172D7}" type="presOf" srcId="{2955A9BB-B772-4BED-A761-88D6294E71E5}" destId="{C55AC184-4B63-4ACF-BAEE-BAFED4D9CE01}" srcOrd="0" destOrd="0" presId="urn:microsoft.com/office/officeart/2005/8/layout/list1"/>
-    <dgm:cxn modelId="{F57140FF-C6E1-4749-BBD2-4F7B784B665F}" type="presOf" srcId="{5B63288E-9A09-405F-8EFD-69E64A5D5ABB}" destId="{DCC890C1-F94A-46B7-86BB-70B2BC9F9AC7}" srcOrd="0" destOrd="0" presId="urn:microsoft.com/office/officeart/2005/8/layout/list1"/>
-    <dgm:cxn modelId="{27726CDC-2302-450F-B4A8-CC5E878D0833}" srcId="{2955A9BB-B772-4BED-A761-88D6294E71E5}" destId="{A57ADE3E-0C8C-4D36-A8FB-BB92178FCA0C}" srcOrd="1" destOrd="0" parTransId="{0888E583-FAE3-4DF0-907A-CB123EF3AFA6}" sibTransId="{9CBCFCCE-1D43-4AC3-B34F-F3F28F62DBED}"/>
-    <dgm:cxn modelId="{FD05F7B7-E05E-435C-AC66-A55FE07BCEF9}" type="presOf" srcId="{60AC6A14-804B-4C73-A3F8-15D682701FA9}" destId="{9379AB90-BD1F-4A03-86B5-4785D3AB64A7}" srcOrd="0" destOrd="0" presId="urn:microsoft.com/office/officeart/2005/8/layout/list1"/>
-    <dgm:cxn modelId="{EA4DFC26-AAF7-47C7-8ED5-B1C0A3F84DC2}" type="presOf" srcId="{81C2013A-F197-40F1-8EE4-3C21F2E1CA71}" destId="{DD943D49-4AE3-447E-B3A5-00B8B281A284}" srcOrd="1" destOrd="0" presId="urn:microsoft.com/office/officeart/2005/8/layout/list1"/>
-    <dgm:cxn modelId="{41E44325-4E28-4A02-8B52-8592C6942564}" type="presOf" srcId="{DBF73EDD-333C-4C62-B881-02122CE5FE61}" destId="{76B3452C-236A-4377-A093-685752666BF0}" srcOrd="0" destOrd="0" presId="urn:microsoft.com/office/officeart/2005/8/layout/list1"/>
-    <dgm:cxn modelId="{A6457D2B-F992-4D3F-9FAA-480FD19AF47D}" type="presOf" srcId="{073B40D1-B301-4BF4-B401-05B2D048F9A5}" destId="{B4C3ACB7-66C8-4B3D-B45F-BCF074EF9EC4}" srcOrd="0" destOrd="0" presId="urn:microsoft.com/office/officeart/2005/8/layout/list1"/>
-    <dgm:cxn modelId="{E4F3DE94-CAD1-47D5-8153-765364DB8A12}" type="presOf" srcId="{60AC6A14-804B-4C73-A3F8-15D682701FA9}" destId="{E14DA548-9018-4DC6-8A10-41646B05C52D}" srcOrd="1" destOrd="0" presId="urn:microsoft.com/office/officeart/2005/8/layout/list1"/>
-    <dgm:cxn modelId="{129604FD-CBE7-4DB3-9DE9-9E4E11BA4FC1}" type="presOf" srcId="{2955A9BB-B772-4BED-A761-88D6294E71E5}" destId="{946F776E-CA37-4577-818D-C4AF700DFAD5}" srcOrd="1" destOrd="0" presId="urn:microsoft.com/office/officeart/2005/8/layout/list1"/>
-    <dgm:cxn modelId="{81D7AA39-7EC8-4FA4-99EC-D757B22D4E3B}" srcId="{81C2013A-F197-40F1-8EE4-3C21F2E1CA71}" destId="{CFFF9D9D-E8F3-480B-BAE3-9050BDB627A5}" srcOrd="0" destOrd="0" parTransId="{6B871A84-A1E1-422A-A290-3287E83BD7D5}" sibTransId="{0DD315D4-0B69-44E9-894F-42886C3F7C41}"/>
     <dgm:cxn modelId="{CF7CF996-AA92-4157-B20E-6A701A889DBA}" type="presOf" srcId="{A57ADE3E-0C8C-4D36-A8FB-BB92178FCA0C}" destId="{DCC890C1-F94A-46B7-86BB-70B2BC9F9AC7}" srcOrd="0" destOrd="1" presId="urn:microsoft.com/office/officeart/2005/8/layout/list1"/>
     <dgm:cxn modelId="{AE5D4CB7-DF23-4CF0-985C-12F924C5E740}" type="presParOf" srcId="{76B3452C-236A-4377-A093-685752666BF0}" destId="{BCA1AF52-FF07-45C4-85E8-613A70A48E55}" srcOrd="0" destOrd="0" presId="urn:microsoft.com/office/officeart/2005/8/layout/list1"/>
     <dgm:cxn modelId="{12D10EFF-6254-4172-8457-0087CE0B65A6}" type="presParOf" srcId="{BCA1AF52-FF07-45C4-85E8-613A70A48E55}" destId="{9379AB90-BD1F-4A03-86B5-4785D3AB64A7}" srcOrd="0" destOrd="0" presId="urn:microsoft.com/office/officeart/2005/8/layout/list1"/>
@@ -10218,7 +10337,7 @@
           <a:p>
             <a:fld id="{8472C7DE-940F-F84D-87FC-CB6C77FFB87A}" type="datetimeFigureOut">
               <a:rPr lang="en-US" smtClean="0"/>
-              <a:t>10/12/2016</a:t>
+              <a:t>11/16/2016</a:t>
             </a:fld>
             <a:endParaRPr lang="en-US"/>
           </a:p>
@@ -10469,7 +10588,7 @@
           <a:p>
             <a:fld id="{8472C7DE-940F-F84D-87FC-CB6C77FFB87A}" type="datetimeFigureOut">
               <a:rPr lang="en-US" smtClean="0"/>
-              <a:t>10/12/2016</a:t>
+              <a:t>11/16/2016</a:t>
             </a:fld>
             <a:endParaRPr lang="en-US"/>
           </a:p>
@@ -10783,7 +10902,7 @@
           <a:p>
             <a:fld id="{8472C7DE-940F-F84D-87FC-CB6C77FFB87A}" type="datetimeFigureOut">
               <a:rPr lang="en-US" smtClean="0"/>
-              <a:t>10/12/2016</a:t>
+              <a:t>11/16/2016</a:t>
             </a:fld>
             <a:endParaRPr lang="en-US"/>
           </a:p>
@@ -11116,7 +11235,7 @@
           <a:p>
             <a:fld id="{8472C7DE-940F-F84D-87FC-CB6C77FFB87A}" type="datetimeFigureOut">
               <a:rPr lang="en-US" smtClean="0"/>
-              <a:t>10/12/2016</a:t>
+              <a:t>11/16/2016</a:t>
             </a:fld>
             <a:endParaRPr lang="en-US"/>
           </a:p>
@@ -11430,7 +11549,7 @@
           <a:p>
             <a:fld id="{8472C7DE-940F-F84D-87FC-CB6C77FFB87A}" type="datetimeFigureOut">
               <a:rPr lang="en-US" smtClean="0"/>
-              <a:t>10/12/2016</a:t>
+              <a:t>11/16/2016</a:t>
             </a:fld>
             <a:endParaRPr lang="en-US"/>
           </a:p>
@@ -11823,7 +11942,7 @@
           <a:p>
             <a:fld id="{8472C7DE-940F-F84D-87FC-CB6C77FFB87A}" type="datetimeFigureOut">
               <a:rPr lang="en-US" smtClean="0"/>
-              <a:t>10/12/2016</a:t>
+              <a:t>11/16/2016</a:t>
             </a:fld>
             <a:endParaRPr lang="en-US"/>
           </a:p>
@@ -11993,7 +12112,7 @@
           <a:p>
             <a:fld id="{8472C7DE-940F-F84D-87FC-CB6C77FFB87A}" type="datetimeFigureOut">
               <a:rPr lang="en-US" smtClean="0"/>
-              <a:t>10/12/2016</a:t>
+              <a:t>11/16/2016</a:t>
             </a:fld>
             <a:endParaRPr lang="en-US"/>
           </a:p>
@@ -12173,7 +12292,7 @@
           <a:p>
             <a:fld id="{8472C7DE-940F-F84D-87FC-CB6C77FFB87A}" type="datetimeFigureOut">
               <a:rPr lang="en-US" smtClean="0"/>
-              <a:t>10/12/2016</a:t>
+              <a:t>11/16/2016</a:t>
             </a:fld>
             <a:endParaRPr lang="en-US"/>
           </a:p>
@@ -12349,7 +12468,7 @@
           <a:p>
             <a:fld id="{8472C7DE-940F-F84D-87FC-CB6C77FFB87A}" type="datetimeFigureOut">
               <a:rPr lang="en-US" smtClean="0"/>
-              <a:t>10/12/2016</a:t>
+              <a:t>11/16/2016</a:t>
             </a:fld>
             <a:endParaRPr lang="en-US"/>
           </a:p>
@@ -12596,7 +12715,7 @@
           <a:p>
             <a:fld id="{8472C7DE-940F-F84D-87FC-CB6C77FFB87A}" type="datetimeFigureOut">
               <a:rPr lang="en-US" smtClean="0"/>
-              <a:t>10/12/2016</a:t>
+              <a:t>11/16/2016</a:t>
             </a:fld>
             <a:endParaRPr lang="en-US"/>
           </a:p>
@@ -12893,7 +13012,7 @@
           <a:p>
             <a:fld id="{8472C7DE-940F-F84D-87FC-CB6C77FFB87A}" type="datetimeFigureOut">
               <a:rPr lang="en-US" smtClean="0"/>
-              <a:t>10/12/2016</a:t>
+              <a:t>11/16/2016</a:t>
             </a:fld>
             <a:endParaRPr lang="en-US"/>
           </a:p>
@@ -13272,7 +13391,7 @@
           <a:p>
             <a:fld id="{8472C7DE-940F-F84D-87FC-CB6C77FFB87A}" type="datetimeFigureOut">
               <a:rPr lang="en-US" smtClean="0"/>
-              <a:t>10/12/2016</a:t>
+              <a:t>11/16/2016</a:t>
             </a:fld>
             <a:endParaRPr lang="en-US"/>
           </a:p>
@@ -13395,7 +13514,7 @@
           <a:p>
             <a:fld id="{8472C7DE-940F-F84D-87FC-CB6C77FFB87A}" type="datetimeFigureOut">
               <a:rPr lang="en-US" smtClean="0"/>
-              <a:t>10/12/2016</a:t>
+              <a:t>11/16/2016</a:t>
             </a:fld>
             <a:endParaRPr lang="en-US"/>
           </a:p>
@@ -13490,7 +13609,7 @@
           <a:p>
             <a:fld id="{8472C7DE-940F-F84D-87FC-CB6C77FFB87A}" type="datetimeFigureOut">
               <a:rPr lang="en-US" smtClean="0"/>
-              <a:t>10/12/2016</a:t>
+              <a:t>11/16/2016</a:t>
             </a:fld>
             <a:endParaRPr lang="en-US"/>
           </a:p>
@@ -13745,7 +13864,7 @@
           <a:p>
             <a:fld id="{8472C7DE-940F-F84D-87FC-CB6C77FFB87A}" type="datetimeFigureOut">
               <a:rPr lang="en-US" smtClean="0"/>
-              <a:t>10/12/2016</a:t>
+              <a:t>11/16/2016</a:t>
             </a:fld>
             <a:endParaRPr lang="en-US"/>
           </a:p>
@@ -14008,7 +14127,7 @@
           <a:p>
             <a:fld id="{8472C7DE-940F-F84D-87FC-CB6C77FFB87A}" type="datetimeFigureOut">
               <a:rPr lang="en-US" smtClean="0"/>
-              <a:t>10/12/2016</a:t>
+              <a:t>11/16/2016</a:t>
             </a:fld>
             <a:endParaRPr lang="en-US"/>
           </a:p>
@@ -14823,7 +14942,7 @@
           <a:p>
             <a:fld id="{8472C7DE-940F-F84D-87FC-CB6C77FFB87A}" type="datetimeFigureOut">
               <a:rPr lang="en-US" smtClean="0"/>
-              <a:t>10/12/2016</a:t>
+              <a:t>11/16/2016</a:t>
             </a:fld>
             <a:endParaRPr lang="en-US"/>
           </a:p>
@@ -17018,9 +17137,10 @@
             <a:p>
               <a:pPr algn="ctr"/>
               <a:r>
-                <a:rPr lang="en-US" dirty="0" smtClean="0"/>
-                <a:t>Open Play</a:t>
+                <a:rPr lang="en-US" smtClean="0"/>
+                <a:t>Special Event</a:t>
               </a:r>
+              <a:endParaRPr lang="en-US" dirty="0" smtClean="0"/>
             </a:p>
             <a:p>
               <a:pPr algn="ctr"/>

</xml_diff>